<commit_message>
Tutorial 17-unit-test-infrastructure Step 7, textual updates on some other tutorials
</commit_message>
<xml_diff>
--- a/doc/images/unittest-class-structure-test-fixture.pptx
+++ b/doc/images/unittest-class-structure-test-fixture.pptx
@@ -192,7 +192,8 @@
           <a:p>
             <a:fld id="{DA8CBD77-ECA8-4ADB-A375-FDD49E6DB29D}" type="datetimeFigureOut">
               <a:rPr lang="en-US" smtClean="0"/>
-              <a:t>2/19/2024</a:t>
+              <a:pPr/>
+              <a:t>3/10/2024</a:t>
             </a:fld>
             <a:endParaRPr lang="en-US"/>
           </a:p>
@@ -353,6 +354,7 @@
           <a:p>
             <a:fld id="{BB5AC0FE-D8C0-47ED-83F1-4189209EBB84}" type="slidenum">
               <a:rPr lang="en-US" smtClean="0"/>
+              <a:pPr/>
               <a:t>‹#›</a:t>
             </a:fld>
             <a:endParaRPr lang="en-US"/>
@@ -524,6 +526,7 @@
           <a:p>
             <a:fld id="{BB5AC0FE-D8C0-47ED-83F1-4189209EBB84}" type="slidenum">
               <a:rPr lang="en-US" smtClean="0"/>
+              <a:pPr/>
               <a:t>1</a:t>
             </a:fld>
             <a:endParaRPr lang="en-US"/>
@@ -720,7 +723,7 @@
             <a:fld id="{EFDD9419-A8AE-4FAD-8E98-7AA1110A699D}" type="datetimeFigureOut">
               <a:rPr lang="en-US" smtClean="0"/>
               <a:pPr/>
-              <a:t>2/19/2024</a:t>
+              <a:t>3/10/2024</a:t>
             </a:fld>
             <a:endParaRPr lang="en-US"/>
           </a:p>
@@ -887,7 +890,7 @@
             <a:fld id="{EFDD9419-A8AE-4FAD-8E98-7AA1110A699D}" type="datetimeFigureOut">
               <a:rPr lang="en-US" smtClean="0"/>
               <a:pPr/>
-              <a:t>2/19/2024</a:t>
+              <a:t>3/10/2024</a:t>
             </a:fld>
             <a:endParaRPr lang="en-US"/>
           </a:p>
@@ -1064,7 +1067,7 @@
             <a:fld id="{EFDD9419-A8AE-4FAD-8E98-7AA1110A699D}" type="datetimeFigureOut">
               <a:rPr lang="en-US" smtClean="0"/>
               <a:pPr/>
-              <a:t>2/19/2024</a:t>
+              <a:t>3/10/2024</a:t>
             </a:fld>
             <a:endParaRPr lang="en-US"/>
           </a:p>
@@ -1231,7 +1234,7 @@
             <a:fld id="{EFDD9419-A8AE-4FAD-8E98-7AA1110A699D}" type="datetimeFigureOut">
               <a:rPr lang="en-US" smtClean="0"/>
               <a:pPr/>
-              <a:t>2/19/2024</a:t>
+              <a:t>3/10/2024</a:t>
             </a:fld>
             <a:endParaRPr lang="en-US"/>
           </a:p>
@@ -1474,7 +1477,7 @@
             <a:fld id="{EFDD9419-A8AE-4FAD-8E98-7AA1110A699D}" type="datetimeFigureOut">
               <a:rPr lang="en-US" smtClean="0"/>
               <a:pPr/>
-              <a:t>2/19/2024</a:t>
+              <a:t>3/10/2024</a:t>
             </a:fld>
             <a:endParaRPr lang="en-US"/>
           </a:p>
@@ -1759,7 +1762,7 @@
             <a:fld id="{EFDD9419-A8AE-4FAD-8E98-7AA1110A699D}" type="datetimeFigureOut">
               <a:rPr lang="en-US" smtClean="0"/>
               <a:pPr/>
-              <a:t>2/19/2024</a:t>
+              <a:t>3/10/2024</a:t>
             </a:fld>
             <a:endParaRPr lang="en-US"/>
           </a:p>
@@ -2178,7 +2181,7 @@
             <a:fld id="{EFDD9419-A8AE-4FAD-8E98-7AA1110A699D}" type="datetimeFigureOut">
               <a:rPr lang="en-US" smtClean="0"/>
               <a:pPr/>
-              <a:t>2/19/2024</a:t>
+              <a:t>3/10/2024</a:t>
             </a:fld>
             <a:endParaRPr lang="en-US"/>
           </a:p>
@@ -2293,7 +2296,7 @@
             <a:fld id="{EFDD9419-A8AE-4FAD-8E98-7AA1110A699D}" type="datetimeFigureOut">
               <a:rPr lang="en-US" smtClean="0"/>
               <a:pPr/>
-              <a:t>2/19/2024</a:t>
+              <a:t>3/10/2024</a:t>
             </a:fld>
             <a:endParaRPr lang="en-US"/>
           </a:p>
@@ -2385,7 +2388,7 @@
             <a:fld id="{EFDD9419-A8AE-4FAD-8E98-7AA1110A699D}" type="datetimeFigureOut">
               <a:rPr lang="en-US" smtClean="0"/>
               <a:pPr/>
-              <a:t>2/19/2024</a:t>
+              <a:t>3/10/2024</a:t>
             </a:fld>
             <a:endParaRPr lang="en-US"/>
           </a:p>
@@ -2659,7 +2662,7 @@
             <a:fld id="{EFDD9419-A8AE-4FAD-8E98-7AA1110A699D}" type="datetimeFigureOut">
               <a:rPr lang="en-US" smtClean="0"/>
               <a:pPr/>
-              <a:t>2/19/2024</a:t>
+              <a:t>3/10/2024</a:t>
             </a:fld>
             <a:endParaRPr lang="en-US"/>
           </a:p>
@@ -2909,7 +2912,7 @@
             <a:fld id="{EFDD9419-A8AE-4FAD-8E98-7AA1110A699D}" type="datetimeFigureOut">
               <a:rPr lang="en-US" smtClean="0"/>
               <a:pPr/>
-              <a:t>2/19/2024</a:t>
+              <a:t>3/10/2024</a:t>
             </a:fld>
             <a:endParaRPr lang="en-US"/>
           </a:p>
@@ -3119,7 +3122,7 @@
             <a:fld id="{EFDD9419-A8AE-4FAD-8E98-7AA1110A699D}" type="datetimeFigureOut">
               <a:rPr lang="en-US" smtClean="0"/>
               <a:pPr/>
-              <a:t>2/19/2024</a:t>
+              <a:t>3/10/2024</a:t>
             </a:fld>
             <a:endParaRPr lang="en-US"/>
           </a:p>
@@ -3498,7 +3501,7 @@
         </p:nvSpPr>
         <p:spPr>
           <a:xfrm>
-            <a:off x="4143372" y="500042"/>
+            <a:off x="2715406" y="500042"/>
             <a:ext cx="1571636" cy="1214446"/>
           </a:xfrm>
           <a:prstGeom prst="rect">
@@ -3602,7 +3605,7 @@
         </p:nvSpPr>
         <p:spPr>
           <a:xfrm>
-            <a:off x="4143372" y="71414"/>
+            <a:off x="2715406" y="71414"/>
             <a:ext cx="1571636" cy="428628"/>
           </a:xfrm>
           <a:prstGeom prst="rect">
@@ -3670,7 +3673,7 @@
         </p:nvCxnSpPr>
         <p:spPr>
           <a:xfrm>
-            <a:off x="3929058" y="285728"/>
+            <a:off x="2501092" y="285728"/>
             <a:ext cx="214314" cy="1588"/>
           </a:xfrm>
           <a:prstGeom prst="straightConnector1">
@@ -3704,7 +3707,7 @@
         </p:nvCxnSpPr>
         <p:spPr>
           <a:xfrm rot="5400000">
-            <a:off x="3749669" y="464323"/>
+            <a:off x="2321703" y="464323"/>
             <a:ext cx="357984" cy="794"/>
           </a:xfrm>
           <a:prstGeom prst="line">
@@ -3734,7 +3737,7 @@
         </p:nvCxnSpPr>
         <p:spPr>
           <a:xfrm>
-            <a:off x="3929058" y="642918"/>
+            <a:off x="2501092" y="642918"/>
             <a:ext cx="214314" cy="1588"/>
           </a:xfrm>
           <a:prstGeom prst="line">
@@ -3764,7 +3767,7 @@
         </p:nvSpPr>
         <p:spPr>
           <a:xfrm>
-            <a:off x="6072198" y="500042"/>
+            <a:off x="4644232" y="500042"/>
             <a:ext cx="1571636" cy="1214446"/>
           </a:xfrm>
           <a:prstGeom prst="rect">
@@ -3820,7 +3823,7 @@
                   <a:schemeClr val="tx1"/>
                 </a:solidFill>
               </a:rPr>
-              <a:t>m_details</a:t>
+              <a:t>m_testInstance</a:t>
             </a:r>
             <a:endParaRPr lang="en-US" sz="1400" dirty="0" smtClean="0">
               <a:solidFill>
@@ -3835,15 +3838,7 @@
                   <a:schemeClr val="tx1"/>
                 </a:solidFill>
               </a:rPr>
-              <a:t>RunImpl</a:t>
-            </a:r>
-            <a:r>
-              <a:rPr lang="en-US" sz="1400" dirty="0" smtClean="0">
-                <a:solidFill>
-                  <a:schemeClr val="tx1"/>
-                </a:solidFill>
-              </a:rPr>
-              <a:t>()</a:t>
+              <a:t>m_details</a:t>
             </a:r>
             <a:endParaRPr lang="en-US" sz="1400" dirty="0" smtClean="0">
               <a:solidFill>
@@ -3851,6 +3846,21 @@
               </a:solidFill>
             </a:endParaRPr>
           </a:p>
+          <a:p>
+            <a:r>
+              <a:rPr lang="en-US" sz="1400" dirty="0" smtClean="0">
+                <a:solidFill>
+                  <a:schemeClr val="tx1"/>
+                </a:solidFill>
+              </a:rPr>
+              <a:t>Run()</a:t>
+            </a:r>
+            <a:endParaRPr lang="en-US" sz="1400" dirty="0" smtClean="0">
+              <a:solidFill>
+                <a:schemeClr val="tx1"/>
+              </a:solidFill>
+            </a:endParaRPr>
+          </a:p>
         </p:txBody>
       </p:sp>
       <p:sp>
@@ -3861,7 +3871,7 @@
         </p:nvSpPr>
         <p:spPr>
           <a:xfrm>
-            <a:off x="6072198" y="71414"/>
+            <a:off x="4644232" y="71414"/>
             <a:ext cx="1571636" cy="428628"/>
           </a:xfrm>
           <a:prstGeom prst="rect">
@@ -3909,7 +3919,7 @@
                   <a:schemeClr val="tx1"/>
                 </a:solidFill>
               </a:rPr>
-              <a:t>TestBase</a:t>
+              <a:t>TestInfo</a:t>
             </a:r>
             <a:endParaRPr lang="en-US" dirty="0">
               <a:solidFill>
@@ -3929,7 +3939,7 @@
         </p:nvCxnSpPr>
         <p:spPr>
           <a:xfrm>
-            <a:off x="5857884" y="285728"/>
+            <a:off x="4429918" y="285728"/>
             <a:ext cx="214314" cy="1588"/>
           </a:xfrm>
           <a:prstGeom prst="straightConnector1">
@@ -3963,7 +3973,7 @@
         </p:nvCxnSpPr>
         <p:spPr>
           <a:xfrm rot="5400000">
-            <a:off x="5678495" y="464323"/>
+            <a:off x="4250529" y="464323"/>
             <a:ext cx="357984" cy="794"/>
           </a:xfrm>
           <a:prstGeom prst="line">
@@ -3993,7 +4003,7 @@
         </p:nvCxnSpPr>
         <p:spPr>
           <a:xfrm>
-            <a:off x="5857884" y="642918"/>
+            <a:off x="4429918" y="642918"/>
             <a:ext cx="214314" cy="1588"/>
           </a:xfrm>
           <a:prstGeom prst="line">
@@ -4025,7 +4035,7 @@
         </p:nvCxnSpPr>
         <p:spPr>
           <a:xfrm>
-            <a:off x="4857752" y="857232"/>
+            <a:off x="3429786" y="857232"/>
             <a:ext cx="1214446" cy="250033"/>
           </a:xfrm>
           <a:prstGeom prst="straightConnector1">
@@ -4061,7 +4071,7 @@
         </p:nvCxnSpPr>
         <p:spPr>
           <a:xfrm>
-            <a:off x="4714876" y="1071546"/>
+            <a:off x="3286910" y="1071546"/>
             <a:ext cx="1357322" cy="35719"/>
           </a:xfrm>
           <a:prstGeom prst="straightConnector1">
@@ -4095,7 +4105,7 @@
         </p:nvSpPr>
         <p:spPr>
           <a:xfrm>
-            <a:off x="3786182" y="2786058"/>
+            <a:off x="3214678" y="3786190"/>
             <a:ext cx="1571636" cy="1214446"/>
           </a:xfrm>
           <a:prstGeom prst="rect">
@@ -4214,7 +4224,7 @@
         </p:nvSpPr>
         <p:spPr>
           <a:xfrm>
-            <a:off x="3786182" y="2357430"/>
+            <a:off x="3214678" y="3357562"/>
             <a:ext cx="1571636" cy="428628"/>
           </a:xfrm>
           <a:prstGeom prst="rect">
@@ -4280,7 +4290,7 @@
         </p:nvSpPr>
         <p:spPr>
           <a:xfrm>
-            <a:off x="6143636" y="1714488"/>
+            <a:off x="4715670" y="1714488"/>
             <a:ext cx="142876" cy="142876"/>
           </a:xfrm>
           <a:prstGeom prst="diamond">
@@ -4320,7 +4330,7 @@
         </p:nvSpPr>
         <p:spPr>
           <a:xfrm>
-            <a:off x="1357290" y="500042"/>
+            <a:off x="642910" y="500042"/>
             <a:ext cx="1571636" cy="1214446"/>
           </a:xfrm>
           <a:prstGeom prst="rect">
@@ -4389,11 +4399,6 @@
               </a:rPr>
               <a:t>()</a:t>
             </a:r>
-            <a:endParaRPr lang="en-US" sz="1400" dirty="0" smtClean="0">
-              <a:solidFill>
-                <a:schemeClr val="tx1"/>
-              </a:solidFill>
-            </a:endParaRPr>
           </a:p>
         </p:txBody>
       </p:sp>
@@ -4405,7 +4410,7 @@
         </p:nvSpPr>
         <p:spPr>
           <a:xfrm>
-            <a:off x="1357290" y="71414"/>
+            <a:off x="642910" y="71414"/>
             <a:ext cx="1571636" cy="428628"/>
           </a:xfrm>
           <a:prstGeom prst="rect">
@@ -4471,7 +4476,7 @@
         </p:nvSpPr>
         <p:spPr>
           <a:xfrm>
-            <a:off x="1000100" y="2714620"/>
+            <a:off x="285720" y="2714620"/>
             <a:ext cx="2286016" cy="1214446"/>
           </a:xfrm>
           <a:prstGeom prst="rect">
@@ -4573,19 +4578,14 @@
               </a:rPr>
               <a:t>()</a:t>
             </a:r>
+          </a:p>
+          <a:p>
             <a:endParaRPr lang="en-US" sz="1400" dirty="0" smtClean="0">
               <a:solidFill>
                 <a:schemeClr val="tx1"/>
               </a:solidFill>
             </a:endParaRPr>
           </a:p>
-          <a:p>
-            <a:endParaRPr lang="en-US" sz="1400" dirty="0" smtClean="0">
-              <a:solidFill>
-                <a:schemeClr val="tx1"/>
-              </a:solidFill>
-            </a:endParaRPr>
-          </a:p>
         </p:txBody>
       </p:sp>
       <p:sp>
@@ -4596,7 +4596,7 @@
         </p:nvSpPr>
         <p:spPr>
           <a:xfrm>
-            <a:off x="1000100" y="2285992"/>
+            <a:off x="285720" y="2285992"/>
             <a:ext cx="2286016" cy="428628"/>
           </a:xfrm>
           <a:prstGeom prst="rect">
@@ -4664,7 +4664,7 @@
         </p:nvCxnSpPr>
         <p:spPr>
           <a:xfrm rot="5400000" flipH="1" flipV="1">
-            <a:off x="1928794" y="2071678"/>
+            <a:off x="1214414" y="2071678"/>
             <a:ext cx="428628" cy="1588"/>
           </a:xfrm>
           <a:prstGeom prst="line">
@@ -4694,7 +4694,7 @@
         </p:nvSpPr>
         <p:spPr>
           <a:xfrm>
-            <a:off x="2071670" y="1714488"/>
+            <a:off x="1357290" y="1714488"/>
             <a:ext cx="142876" cy="142876"/>
           </a:xfrm>
           <a:prstGeom prst="triangle">
@@ -4735,7 +4735,7 @@
         <p:spPr>
           <a:xfrm>
             <a:off x="5715008" y="2786058"/>
-            <a:ext cx="2286016" cy="1428760"/>
+            <a:ext cx="3286148" cy="1428760"/>
           </a:xfrm>
           <a:prstGeom prst="rect">
             <a:avLst/>
@@ -4803,23 +4803,7 @@
                   <a:schemeClr val="tx1"/>
                 </a:solidFill>
               </a:rPr>
-              <a:t>    </a:t>
-            </a:r>
-            <a:r>
-              <a:rPr lang="en-US" sz="1400" dirty="0" smtClean="0">
-                <a:solidFill>
-                  <a:schemeClr val="tx1"/>
-                </a:solidFill>
-              </a:rPr>
-              <a:t>&lt;Fixture&gt;&lt;</a:t>
-            </a:r>
-            <a:r>
-              <a:rPr lang="en-US" sz="1400" dirty="0" smtClean="0">
-                <a:solidFill>
-                  <a:schemeClr val="tx1"/>
-                </a:solidFill>
-              </a:rPr>
-              <a:t>Test&gt;Helper </a:t>
+              <a:t>    &lt;Fixture&gt;&lt;Test&gt;Helper </a:t>
             </a:r>
             <a:r>
               <a:rPr lang="en-US" sz="1400" dirty="0" err="1" smtClean="0">
@@ -4845,15 +4829,7 @@
                   <a:schemeClr val="tx1"/>
                 </a:solidFill>
               </a:rPr>
-              <a:t> </a:t>
-            </a:r>
-            <a:r>
-              <a:rPr lang="en-US" sz="1400" dirty="0" smtClean="0">
-                <a:solidFill>
-                  <a:schemeClr val="tx1"/>
-                </a:solidFill>
-              </a:rPr>
-              <a:t>   </a:t>
+              <a:t>    </a:t>
             </a:r>
             <a:r>
               <a:rPr lang="en-US" sz="1400" dirty="0" err="1" smtClean="0">
@@ -4898,7 +4874,7 @@
         <p:spPr>
           <a:xfrm>
             <a:off x="5715008" y="2357430"/>
-            <a:ext cx="2286016" cy="428628"/>
+            <a:ext cx="3286148" cy="428628"/>
           </a:xfrm>
           <a:prstGeom prst="rect">
             <a:avLst/>
@@ -4966,12 +4942,12 @@
         </p:nvCxnSpPr>
         <p:spPr>
           <a:xfrm rot="5400000" flipH="1" flipV="1">
-            <a:off x="5143504" y="1285860"/>
-            <a:ext cx="500066" cy="1643074"/>
+            <a:off x="3643703" y="2214157"/>
+            <a:ext cx="1500198" cy="786612"/>
           </a:xfrm>
           <a:prstGeom prst="bentConnector3">
             <a:avLst>
-              <a:gd name="adj1" fmla="val 45238"/>
+              <a:gd name="adj1" fmla="val 37937"/>
             </a:avLst>
           </a:prstGeom>
         </p:spPr>
@@ -4998,7 +4974,7 @@
         </p:nvSpPr>
         <p:spPr>
           <a:xfrm>
-            <a:off x="3286116" y="2714620"/>
+            <a:off x="2571736" y="2714620"/>
             <a:ext cx="142876" cy="142876"/>
           </a:xfrm>
           <a:prstGeom prst="diamond">
@@ -5040,15 +5016,12 @@
           <p:nvPr/>
         </p:nvCxnSpPr>
         <p:spPr>
-          <a:xfrm flipV="1">
-            <a:off x="3428992" y="2357430"/>
-            <a:ext cx="1143008" cy="428628"/>
-          </a:xfrm>
-          <a:prstGeom prst="bentConnector4">
-            <a:avLst>
-              <a:gd name="adj1" fmla="val 15625"/>
-              <a:gd name="adj2" fmla="val 153333"/>
-            </a:avLst>
+          <a:xfrm>
+            <a:off x="2714612" y="2786058"/>
+            <a:ext cx="1285884" cy="571504"/>
+          </a:xfrm>
+          <a:prstGeom prst="bentConnector2">
+            <a:avLst/>
           </a:prstGeom>
         </p:spPr>
         <p:style>
@@ -5071,13 +5044,14 @@
           <p:cNvPr id="69" name="Straight Connector 68"/>
           <p:cNvCxnSpPr>
             <a:stCxn id="52" idx="0"/>
+            <a:endCxn id="32" idx="3"/>
           </p:cNvCxnSpPr>
           <p:nvPr/>
         </p:nvCxnSpPr>
         <p:spPr>
           <a:xfrm rot="5400000" flipH="1" flipV="1">
-            <a:off x="6608777" y="2107397"/>
-            <a:ext cx="499272" cy="794"/>
+            <a:off x="7108446" y="2107000"/>
+            <a:ext cx="500066" cy="794"/>
           </a:xfrm>
           <a:prstGeom prst="line">
             <a:avLst/>
@@ -5100,18 +5074,26 @@
       </p:cxnSp>
       <p:sp>
         <p:nvSpPr>
-          <p:cNvPr id="70" name="Isosceles Triangle 69"/>
+          <p:cNvPr id="30" name="Rectangle 29"/>
           <p:cNvSpPr/>
           <p:nvPr/>
         </p:nvSpPr>
         <p:spPr>
           <a:xfrm>
-            <a:off x="6786578" y="1714488"/>
-            <a:ext cx="142876" cy="142876"/>
-          </a:xfrm>
-          <a:prstGeom prst="triangle">
+            <a:off x="6573058" y="500042"/>
+            <a:ext cx="1571636" cy="1214446"/>
+          </a:xfrm>
+          <a:prstGeom prst="rect">
             <a:avLst/>
           </a:prstGeom>
+          <a:noFill/>
+          <a:ln>
+            <a:solidFill>
+              <a:schemeClr val="bg1">
+                <a:lumMod val="75000"/>
+              </a:schemeClr>
+            </a:solidFill>
+          </a:ln>
         </p:spPr>
         <p:style>
           <a:lnRef idx="2">
@@ -5130,14 +5112,175 @@
           </a:fontRef>
         </p:style>
         <p:txBody>
+          <a:bodyPr rtlCol="0" anchor="t"/>
+          <a:lstStyle/>
+          <a:p>
+            <a:r>
+              <a:rPr lang="en-US" sz="1400" dirty="0" err="1" smtClean="0">
+                <a:solidFill>
+                  <a:schemeClr val="tx1"/>
+                </a:solidFill>
+              </a:rPr>
+              <a:t>RunImpl</a:t>
+            </a:r>
+            <a:r>
+              <a:rPr lang="en-US" sz="1400" dirty="0" smtClean="0">
+                <a:solidFill>
+                  <a:schemeClr val="tx1"/>
+                </a:solidFill>
+              </a:rPr>
+              <a:t>()</a:t>
+            </a:r>
+            <a:endParaRPr lang="en-US" sz="1400" dirty="0" smtClean="0">
+              <a:solidFill>
+                <a:schemeClr val="tx1"/>
+              </a:solidFill>
+            </a:endParaRPr>
+          </a:p>
+        </p:txBody>
+      </p:sp>
+      <p:sp>
+        <p:nvSpPr>
+          <p:cNvPr id="31" name="Rectangle 30"/>
+          <p:cNvSpPr/>
+          <p:nvPr/>
+        </p:nvSpPr>
+        <p:spPr>
+          <a:xfrm>
+            <a:off x="6573058" y="71414"/>
+            <a:ext cx="1571636" cy="428628"/>
+          </a:xfrm>
+          <a:prstGeom prst="rect">
+            <a:avLst/>
+          </a:prstGeom>
+          <a:solidFill>
+            <a:schemeClr val="accent2">
+              <a:lumMod val="20000"/>
+              <a:lumOff val="80000"/>
+            </a:schemeClr>
+          </a:solidFill>
+          <a:ln>
+            <a:solidFill>
+              <a:schemeClr val="accent2">
+                <a:lumMod val="40000"/>
+                <a:lumOff val="60000"/>
+              </a:schemeClr>
+            </a:solidFill>
+          </a:ln>
+        </p:spPr>
+        <p:style>
+          <a:lnRef idx="2">
+            <a:schemeClr val="accent1">
+              <a:shade val="50000"/>
+            </a:schemeClr>
+          </a:lnRef>
+          <a:fillRef idx="1">
+            <a:schemeClr val="accent1"/>
+          </a:fillRef>
+          <a:effectRef idx="0">
+            <a:schemeClr val="accent1"/>
+          </a:effectRef>
+          <a:fontRef idx="minor">
+            <a:schemeClr val="lt1"/>
+          </a:fontRef>
+        </p:style>
+        <p:txBody>
           <a:bodyPr rtlCol="0" anchor="ctr"/>
           <a:lstStyle/>
           <a:p>
             <a:pPr algn="ctr"/>
-            <a:endParaRPr lang="en-US"/>
-          </a:p>
-        </p:txBody>
-      </p:sp>
+            <a:r>
+              <a:rPr lang="en-US" dirty="0" smtClean="0">
+                <a:solidFill>
+                  <a:schemeClr val="tx1"/>
+                </a:solidFill>
+              </a:rPr>
+              <a:t>Test</a:t>
+            </a:r>
+            <a:endParaRPr lang="en-US" dirty="0">
+              <a:solidFill>
+                <a:schemeClr val="tx1"/>
+              </a:solidFill>
+            </a:endParaRPr>
+          </a:p>
+        </p:txBody>
+      </p:sp>
+      <p:sp>
+        <p:nvSpPr>
+          <p:cNvPr id="32" name="Isosceles Triangle 31"/>
+          <p:cNvSpPr/>
+          <p:nvPr/>
+        </p:nvSpPr>
+        <p:spPr>
+          <a:xfrm>
+            <a:off x="7287438" y="1714488"/>
+            <a:ext cx="142876" cy="142876"/>
+          </a:xfrm>
+          <a:prstGeom prst="triangle">
+            <a:avLst/>
+          </a:prstGeom>
+        </p:spPr>
+        <p:style>
+          <a:lnRef idx="2">
+            <a:schemeClr val="accent1">
+              <a:shade val="50000"/>
+            </a:schemeClr>
+          </a:lnRef>
+          <a:fillRef idx="1">
+            <a:schemeClr val="accent1"/>
+          </a:fillRef>
+          <a:effectRef idx="0">
+            <a:schemeClr val="accent1"/>
+          </a:effectRef>
+          <a:fontRef idx="minor">
+            <a:schemeClr val="lt1"/>
+          </a:fontRef>
+        </p:style>
+        <p:txBody>
+          <a:bodyPr rtlCol="0" anchor="ctr"/>
+          <a:lstStyle/>
+          <a:p>
+            <a:pPr algn="ctr"/>
+            <a:endParaRPr lang="en-US"/>
+          </a:p>
+        </p:txBody>
+      </p:sp>
+      <p:cxnSp>
+        <p:nvCxnSpPr>
+          <p:cNvPr id="44" name="Straight Arrow Connector 43"/>
+          <p:cNvCxnSpPr>
+            <a:endCxn id="30" idx="1"/>
+          </p:cNvCxnSpPr>
+          <p:nvPr/>
+        </p:nvCxnSpPr>
+        <p:spPr>
+          <a:xfrm>
+            <a:off x="5857884" y="928670"/>
+            <a:ext cx="715174" cy="178595"/>
+          </a:xfrm>
+          <a:prstGeom prst="straightConnector1">
+            <a:avLst/>
+          </a:prstGeom>
+          <a:ln>
+            <a:headEnd type="none" w="med" len="med"/>
+            <a:tailEnd type="triangle" w="med" len="med"/>
+          </a:ln>
+        </p:spPr>
+        <p:style>
+          <a:lnRef idx="1">
+            <a:schemeClr val="accent1"/>
+          </a:lnRef>
+          <a:fillRef idx="0">
+            <a:schemeClr val="accent1"/>
+          </a:fillRef>
+          <a:effectRef idx="0">
+            <a:schemeClr val="accent1"/>
+          </a:effectRef>
+          <a:fontRef idx="minor">
+            <a:schemeClr val="tx1"/>
+          </a:fontRef>
+        </p:style>
+      </p:cxnSp>
     </p:spTree>
   </p:cSld>
   <p:clrMapOvr>

</xml_diff>